<commit_message>
Add convert to excel button
</commit_message>
<xml_diff>
--- a/Documents/Зелінський_Олександр.pptx
+++ b/Documents/Зелінський_Олександр.pptx
@@ -5,27 +5,26 @@
     <p:sldMasterId id="2147483728" r:id="rId1"/>
   </p:sldMasterIdLst>
   <p:notesMasterIdLst>
-    <p:notesMasterId r:id="rId20"/>
+    <p:notesMasterId r:id="rId19"/>
   </p:notesMasterIdLst>
   <p:sldIdLst>
-    <p:sldId id="256" r:id="rId2"/>
-    <p:sldId id="276" r:id="rId3"/>
-    <p:sldId id="257" r:id="rId4"/>
-    <p:sldId id="260" r:id="rId5"/>
-    <p:sldId id="259" r:id="rId6"/>
-    <p:sldId id="262" r:id="rId7"/>
-    <p:sldId id="263" r:id="rId8"/>
-    <p:sldId id="270" r:id="rId9"/>
-    <p:sldId id="261" r:id="rId10"/>
-    <p:sldId id="271" r:id="rId11"/>
-    <p:sldId id="267" r:id="rId12"/>
-    <p:sldId id="272" r:id="rId13"/>
-    <p:sldId id="264" r:id="rId14"/>
-    <p:sldId id="274" r:id="rId15"/>
-    <p:sldId id="273" r:id="rId16"/>
-    <p:sldId id="275" r:id="rId17"/>
-    <p:sldId id="265" r:id="rId18"/>
-    <p:sldId id="258" r:id="rId19"/>
+    <p:sldId id="276" r:id="rId2"/>
+    <p:sldId id="257" r:id="rId3"/>
+    <p:sldId id="260" r:id="rId4"/>
+    <p:sldId id="259" r:id="rId5"/>
+    <p:sldId id="262" r:id="rId6"/>
+    <p:sldId id="263" r:id="rId7"/>
+    <p:sldId id="270" r:id="rId8"/>
+    <p:sldId id="261" r:id="rId9"/>
+    <p:sldId id="271" r:id="rId10"/>
+    <p:sldId id="267" r:id="rId11"/>
+    <p:sldId id="272" r:id="rId12"/>
+    <p:sldId id="264" r:id="rId13"/>
+    <p:sldId id="274" r:id="rId14"/>
+    <p:sldId id="273" r:id="rId15"/>
+    <p:sldId id="275" r:id="rId16"/>
+    <p:sldId id="265" r:id="rId17"/>
+    <p:sldId id="258" r:id="rId18"/>
   </p:sldIdLst>
   <p:sldSz cx="12192000" cy="6858000"/>
   <p:notesSz cx="6858000" cy="9144000"/>
@@ -220,7 +219,7 @@
           <a:p>
             <a:fld id="{586FF3FF-D377-4670-B4E0-8859B8BB81C2}" type="datetimeFigureOut">
               <a:rPr lang="en-US" smtClean="0"/>
-              <a:t>4/23/2022</a:t>
+              <a:t>5/7/2022</a:t>
             </a:fld>
             <a:endParaRPr lang="en-US"/>
           </a:p>
@@ -553,7 +552,7 @@
           <a:p>
             <a:fld id="{FFFB1F85-1FC8-4A32-B703-46BE2030F80F}" type="slidenum">
               <a:rPr lang="en-US" smtClean="0"/>
-              <a:t>10</a:t>
+              <a:t>9</a:t>
             </a:fld>
             <a:endParaRPr lang="en-US"/>
           </a:p>
@@ -661,7 +660,7 @@
           <a:p>
             <a:fld id="{FFFB1F85-1FC8-4A32-B703-46BE2030F80F}" type="slidenum">
               <a:rPr lang="en-US" smtClean="0"/>
-              <a:t>11</a:t>
+              <a:t>10</a:t>
             </a:fld>
             <a:endParaRPr lang="en-US"/>
           </a:p>
@@ -749,7 +748,7 @@
           <a:p>
             <a:fld id="{FFFB1F85-1FC8-4A32-B703-46BE2030F80F}" type="slidenum">
               <a:rPr lang="en-US" smtClean="0"/>
-              <a:t>12</a:t>
+              <a:t>11</a:t>
             </a:fld>
             <a:endParaRPr lang="en-US"/>
           </a:p>
@@ -833,7 +832,7 @@
           <a:p>
             <a:fld id="{FFFB1F85-1FC8-4A32-B703-46BE2030F80F}" type="slidenum">
               <a:rPr lang="en-US" smtClean="0"/>
-              <a:t>17</a:t>
+              <a:t>16</a:t>
             </a:fld>
             <a:endParaRPr lang="en-US"/>
           </a:p>
@@ -1597,7 +1596,7 @@
           <a:p>
             <a:fld id="{716955FD-5218-4B18-8B2D-05970B9A6621}" type="datetimeFigureOut">
               <a:rPr lang="en-US" smtClean="0"/>
-              <a:t>4/23/2022</a:t>
+              <a:t>5/7/2022</a:t>
             </a:fld>
             <a:endParaRPr lang="en-US"/>
           </a:p>
@@ -1848,7 +1847,7 @@
           <a:p>
             <a:fld id="{716955FD-5218-4B18-8B2D-05970B9A6621}" type="datetimeFigureOut">
               <a:rPr lang="en-US" smtClean="0"/>
-              <a:t>4/23/2022</a:t>
+              <a:t>5/7/2022</a:t>
             </a:fld>
             <a:endParaRPr lang="en-US"/>
           </a:p>
@@ -2162,7 +2161,7 @@
           <a:p>
             <a:fld id="{716955FD-5218-4B18-8B2D-05970B9A6621}" type="datetimeFigureOut">
               <a:rPr lang="en-US" smtClean="0"/>
-              <a:t>4/23/2022</a:t>
+              <a:t>5/7/2022</a:t>
             </a:fld>
             <a:endParaRPr lang="en-US"/>
           </a:p>
@@ -2495,7 +2494,7 @@
           <a:p>
             <a:fld id="{716955FD-5218-4B18-8B2D-05970B9A6621}" type="datetimeFigureOut">
               <a:rPr lang="en-US" smtClean="0"/>
-              <a:t>4/23/2022</a:t>
+              <a:t>5/7/2022</a:t>
             </a:fld>
             <a:endParaRPr lang="en-US"/>
           </a:p>
@@ -2809,7 +2808,7 @@
           <a:p>
             <a:fld id="{716955FD-5218-4B18-8B2D-05970B9A6621}" type="datetimeFigureOut">
               <a:rPr lang="en-US" smtClean="0"/>
-              <a:t>4/23/2022</a:t>
+              <a:t>5/7/2022</a:t>
             </a:fld>
             <a:endParaRPr lang="en-US"/>
           </a:p>
@@ -3202,7 +3201,7 @@
           <a:p>
             <a:fld id="{716955FD-5218-4B18-8B2D-05970B9A6621}" type="datetimeFigureOut">
               <a:rPr lang="en-US" smtClean="0"/>
-              <a:t>4/23/2022</a:t>
+              <a:t>5/7/2022</a:t>
             </a:fld>
             <a:endParaRPr lang="en-US"/>
           </a:p>
@@ -3372,7 +3371,7 @@
           <a:p>
             <a:fld id="{716955FD-5218-4B18-8B2D-05970B9A6621}" type="datetimeFigureOut">
               <a:rPr lang="en-US" smtClean="0"/>
-              <a:t>4/23/2022</a:t>
+              <a:t>5/7/2022</a:t>
             </a:fld>
             <a:endParaRPr lang="en-US"/>
           </a:p>
@@ -3552,7 +3551,7 @@
           <a:p>
             <a:fld id="{716955FD-5218-4B18-8B2D-05970B9A6621}" type="datetimeFigureOut">
               <a:rPr lang="en-US" smtClean="0"/>
-              <a:t>4/23/2022</a:t>
+              <a:t>5/7/2022</a:t>
             </a:fld>
             <a:endParaRPr lang="en-US"/>
           </a:p>
@@ -3722,7 +3721,7 @@
           <a:p>
             <a:fld id="{716955FD-5218-4B18-8B2D-05970B9A6621}" type="datetimeFigureOut">
               <a:rPr lang="en-US" smtClean="0"/>
-              <a:t>4/23/2022</a:t>
+              <a:t>5/7/2022</a:t>
             </a:fld>
             <a:endParaRPr lang="en-US"/>
           </a:p>
@@ -3969,7 +3968,7 @@
           <a:p>
             <a:fld id="{716955FD-5218-4B18-8B2D-05970B9A6621}" type="datetimeFigureOut">
               <a:rPr lang="en-US" smtClean="0"/>
-              <a:t>4/23/2022</a:t>
+              <a:t>5/7/2022</a:t>
             </a:fld>
             <a:endParaRPr lang="en-US"/>
           </a:p>
@@ -4201,7 +4200,7 @@
           <a:p>
             <a:fld id="{716955FD-5218-4B18-8B2D-05970B9A6621}" type="datetimeFigureOut">
               <a:rPr lang="en-US" smtClean="0"/>
-              <a:t>4/23/2022</a:t>
+              <a:t>5/7/2022</a:t>
             </a:fld>
             <a:endParaRPr lang="en-US"/>
           </a:p>
@@ -4575,7 +4574,7 @@
           <a:p>
             <a:fld id="{716955FD-5218-4B18-8B2D-05970B9A6621}" type="datetimeFigureOut">
               <a:rPr lang="en-US" smtClean="0"/>
-              <a:t>4/23/2022</a:t>
+              <a:t>5/7/2022</a:t>
             </a:fld>
             <a:endParaRPr lang="en-US"/>
           </a:p>
@@ -4698,7 +4697,7 @@
           <a:p>
             <a:fld id="{716955FD-5218-4B18-8B2D-05970B9A6621}" type="datetimeFigureOut">
               <a:rPr lang="en-US" smtClean="0"/>
-              <a:t>4/23/2022</a:t>
+              <a:t>5/7/2022</a:t>
             </a:fld>
             <a:endParaRPr lang="en-US"/>
           </a:p>
@@ -4793,7 +4792,7 @@
           <a:p>
             <a:fld id="{716955FD-5218-4B18-8B2D-05970B9A6621}" type="datetimeFigureOut">
               <a:rPr lang="en-US" smtClean="0"/>
-              <a:t>4/23/2022</a:t>
+              <a:t>5/7/2022</a:t>
             </a:fld>
             <a:endParaRPr lang="en-US"/>
           </a:p>
@@ -5048,7 +5047,7 @@
           <a:p>
             <a:fld id="{716955FD-5218-4B18-8B2D-05970B9A6621}" type="datetimeFigureOut">
               <a:rPr lang="en-US" smtClean="0"/>
-              <a:t>4/23/2022</a:t>
+              <a:t>5/7/2022</a:t>
             </a:fld>
             <a:endParaRPr lang="en-US"/>
           </a:p>
@@ -5353,7 +5352,7 @@
           <a:p>
             <a:fld id="{716955FD-5218-4B18-8B2D-05970B9A6621}" type="datetimeFigureOut">
               <a:rPr lang="en-US" smtClean="0"/>
-              <a:t>4/23/2022</a:t>
+              <a:t>5/7/2022</a:t>
             </a:fld>
             <a:endParaRPr lang="en-US"/>
           </a:p>
@@ -6055,7 +6054,7 @@
           <a:p>
             <a:fld id="{716955FD-5218-4B18-8B2D-05970B9A6621}" type="datetimeFigureOut">
               <a:rPr lang="en-US" smtClean="0"/>
-              <a:t>4/23/2022</a:t>
+              <a:t>5/7/2022</a:t>
             </a:fld>
             <a:endParaRPr lang="en-US"/>
           </a:p>
@@ -6563,7 +6562,7 @@
 </file>
 
 <file path=ppt/slides/slide1.xml><?xml version="1.0" encoding="utf-8"?>
-<p:sld xmlns:a="http://schemas.openxmlformats.org/drawingml/2006/main" xmlns:r="http://schemas.openxmlformats.org/officeDocument/2006/relationships" xmlns:p="http://schemas.openxmlformats.org/presentationml/2006/main" show="0">
+<p:sld xmlns:a="http://schemas.openxmlformats.org/drawingml/2006/main" xmlns:r="http://schemas.openxmlformats.org/officeDocument/2006/relationships" xmlns:p="http://schemas.openxmlformats.org/presentationml/2006/main">
   <p:cSld>
     <p:spTree>
       <p:nvGrpSpPr>
@@ -6597,7 +6596,7 @@
         </p:nvSpPr>
         <p:spPr>
           <a:xfrm>
-            <a:off x="1116449" y="2404531"/>
+            <a:off x="1116449" y="2267901"/>
             <a:ext cx="8320514" cy="1646302"/>
           </a:xfrm>
         </p:spPr>
@@ -6607,13 +6606,21 @@
           <a:p>
             <a:pPr algn="ctr"/>
             <a:r>
+              <a:rPr lang="uk-UA" sz="3600" dirty="0">
+                <a:solidFill>
+                  <a:srgbClr val="0070C0"/>
+                </a:solidFill>
+              </a:rPr>
+              <a:t>Розробка системи к</a:t>
+            </a:r>
+            <a:r>
               <a:rPr lang="uk-UA" sz="3600" i="0" dirty="0">
                 <a:solidFill>
                   <a:srgbClr val="0070C0"/>
                 </a:solidFill>
                 <a:effectLst/>
               </a:rPr>
-              <a:t>Схематичне відображення 2D образів точок зв'язування антитіл на вірусному білку</a:t>
+              <a:t>ластеризації антитіл на основі коефіцієнту перехресного зв’язування</a:t>
             </a:r>
             <a:endParaRPr lang="uk-UA" sz="3600" dirty="0">
               <a:solidFill>
@@ -6764,7 +6771,7 @@
     </p:spTree>
     <p:extLst>
       <p:ext uri="{BB962C8B-B14F-4D97-AF65-F5344CB8AC3E}">
-        <p14:creationId xmlns:p14="http://schemas.microsoft.com/office/powerpoint/2010/main" val="1870223237"/>
+        <p14:creationId xmlns:p14="http://schemas.microsoft.com/office/powerpoint/2010/main" val="3087773559"/>
       </p:ext>
     </p:extLst>
   </p:cSld>
@@ -6775,258 +6782,6 @@
 </file>
 
 <file path=ppt/slides/slide10.xml><?xml version="1.0" encoding="utf-8"?>
-<p:sld xmlns:a="http://schemas.openxmlformats.org/drawingml/2006/main" xmlns:r="http://schemas.openxmlformats.org/officeDocument/2006/relationships" xmlns:p="http://schemas.openxmlformats.org/presentationml/2006/main">
-  <p:cSld>
-    <p:spTree>
-      <p:nvGrpSpPr>
-        <p:cNvPr id="1" name=""/>
-        <p:cNvGrpSpPr/>
-        <p:nvPr/>
-      </p:nvGrpSpPr>
-      <p:grpSpPr>
-        <a:xfrm>
-          <a:off x="0" y="0"/>
-          <a:ext cx="0" cy="0"/>
-          <a:chOff x="0" y="0"/>
-          <a:chExt cx="0" cy="0"/>
-        </a:xfrm>
-      </p:grpSpPr>
-      <p:sp>
-        <p:nvSpPr>
-          <p:cNvPr id="4" name="Заголовок 1">
-            <a:extLst>
-              <a:ext uri="{FF2B5EF4-FFF2-40B4-BE49-F238E27FC236}">
-                <a16:creationId xmlns:a16="http://schemas.microsoft.com/office/drawing/2014/main" id="{F8243150-867F-42C4-B527-2FA91B461363}"/>
-              </a:ext>
-            </a:extLst>
-          </p:cNvPr>
-          <p:cNvSpPr txBox="1">
-            <a:spLocks/>
-          </p:cNvSpPr>
-          <p:nvPr/>
-        </p:nvSpPr>
-        <p:spPr>
-          <a:xfrm>
-            <a:off x="233328" y="238379"/>
-            <a:ext cx="9081856" cy="747042"/>
-          </a:xfrm>
-          <a:prstGeom prst="rect">
-            <a:avLst/>
-          </a:prstGeom>
-        </p:spPr>
-        <p:txBody>
-          <a:bodyPr vert="horz" lIns="91440" tIns="45720" rIns="91440" bIns="45720" rtlCol="0" anchor="t">
-            <a:normAutofit/>
-          </a:bodyPr>
-          <a:lstStyle>
-            <a:lvl1pPr algn="l" defTabSz="457200" rtl="0" eaLnBrk="1" latinLnBrk="0" hangingPunct="1">
-              <a:spcBef>
-                <a:spcPct val="0"/>
-              </a:spcBef>
-              <a:buNone/>
-              <a:defRPr sz="3600" kern="1200">
-                <a:solidFill>
-                  <a:schemeClr val="accent1"/>
-                </a:solidFill>
-                <a:latin typeface="+mj-lt"/>
-                <a:ea typeface="+mj-ea"/>
-                <a:cs typeface="+mj-cs"/>
-              </a:defRPr>
-            </a:lvl1pPr>
-            <a:lvl2pPr eaLnBrk="1" hangingPunct="1">
-              <a:defRPr>
-                <a:solidFill>
-                  <a:schemeClr val="tx2"/>
-                </a:solidFill>
-              </a:defRPr>
-            </a:lvl2pPr>
-            <a:lvl3pPr eaLnBrk="1" hangingPunct="1">
-              <a:defRPr>
-                <a:solidFill>
-                  <a:schemeClr val="tx2"/>
-                </a:solidFill>
-              </a:defRPr>
-            </a:lvl3pPr>
-            <a:lvl4pPr eaLnBrk="1" hangingPunct="1">
-              <a:defRPr>
-                <a:solidFill>
-                  <a:schemeClr val="tx2"/>
-                </a:solidFill>
-              </a:defRPr>
-            </a:lvl4pPr>
-            <a:lvl5pPr eaLnBrk="1" hangingPunct="1">
-              <a:defRPr>
-                <a:solidFill>
-                  <a:schemeClr val="tx2"/>
-                </a:solidFill>
-              </a:defRPr>
-            </a:lvl5pPr>
-            <a:lvl6pPr eaLnBrk="1" hangingPunct="1">
-              <a:defRPr>
-                <a:solidFill>
-                  <a:schemeClr val="tx2"/>
-                </a:solidFill>
-              </a:defRPr>
-            </a:lvl6pPr>
-            <a:lvl7pPr eaLnBrk="1" hangingPunct="1">
-              <a:defRPr>
-                <a:solidFill>
-                  <a:schemeClr val="tx2"/>
-                </a:solidFill>
-              </a:defRPr>
-            </a:lvl7pPr>
-            <a:lvl8pPr eaLnBrk="1" hangingPunct="1">
-              <a:defRPr>
-                <a:solidFill>
-                  <a:schemeClr val="tx2"/>
-                </a:solidFill>
-              </a:defRPr>
-            </a:lvl8pPr>
-            <a:lvl9pPr eaLnBrk="1" hangingPunct="1">
-              <a:defRPr>
-                <a:solidFill>
-                  <a:schemeClr val="tx2"/>
-                </a:solidFill>
-              </a:defRPr>
-            </a:lvl9pPr>
-          </a:lstStyle>
-          <a:p>
-            <a:r>
-              <a:rPr lang="uk-UA" dirty="0">
-                <a:solidFill>
-                  <a:srgbClr val="0070C0"/>
-                </a:solidFill>
-              </a:rPr>
-              <a:t>Метод кластеризації </a:t>
-            </a:r>
-            <a:r>
-              <a:rPr lang="en-US" dirty="0">
-                <a:solidFill>
-                  <a:srgbClr val="0070C0"/>
-                </a:solidFill>
-              </a:rPr>
-              <a:t>k-means</a:t>
-            </a:r>
-            <a:r>
-              <a:rPr lang="uk-UA" dirty="0">
-                <a:solidFill>
-                  <a:srgbClr val="0070C0"/>
-                </a:solidFill>
-              </a:rPr>
-              <a:t> </a:t>
-            </a:r>
-          </a:p>
-        </p:txBody>
-      </p:sp>
-      <p:sp>
-        <p:nvSpPr>
-          <p:cNvPr id="8" name="TextBox 7">
-            <a:extLst>
-              <a:ext uri="{FF2B5EF4-FFF2-40B4-BE49-F238E27FC236}">
-                <a16:creationId xmlns:a16="http://schemas.microsoft.com/office/drawing/2014/main" id="{18852229-13C1-495A-8A2F-9EFD183EDC50}"/>
-              </a:ext>
-            </a:extLst>
-          </p:cNvPr>
-          <p:cNvSpPr txBox="1"/>
-          <p:nvPr/>
-        </p:nvSpPr>
-        <p:spPr>
-          <a:xfrm>
-            <a:off x="633613" y="3397417"/>
-            <a:ext cx="8491492" cy="2805833"/>
-          </a:xfrm>
-          <a:prstGeom prst="rect">
-            <a:avLst/>
-          </a:prstGeom>
-          <a:noFill/>
-        </p:spPr>
-        <p:txBody>
-          <a:bodyPr wrap="square">
-            <a:spAutoFit/>
-          </a:bodyPr>
-          <a:lstStyle/>
-          <a:p>
-            <a:pPr algn="just">
-              <a:lnSpc>
-                <a:spcPct val="150000"/>
-              </a:lnSpc>
-            </a:pPr>
-            <a:r>
-              <a:rPr lang="uk-UA" sz="2000" dirty="0"/>
-              <a:t>	</a:t>
-            </a:r>
-            <a:r>
-              <a:rPr lang="en-US" sz="2000" dirty="0"/>
-              <a:t>k-means (</a:t>
-            </a:r>
-            <a:r>
-              <a:rPr lang="uk-UA" sz="2000" dirty="0"/>
-              <a:t>k-середніх</a:t>
-            </a:r>
-            <a:r>
-              <a:rPr lang="en-US" sz="2000" dirty="0"/>
-              <a:t>)</a:t>
-            </a:r>
-            <a:r>
-              <a:rPr lang="uk-UA" sz="2000" dirty="0"/>
-              <a:t> – це популярний алгоритм кластеризації на основі </a:t>
-            </a:r>
-            <a:r>
-              <a:rPr lang="uk-UA" sz="2000" dirty="0" err="1"/>
-              <a:t>центроїдів</a:t>
-            </a:r>
-            <a:r>
-              <a:rPr lang="uk-UA" sz="2000" dirty="0"/>
-              <a:t>, який розділяє дані представлені у вигляді точок на k кластерів, кожен із яких має майже рівну кількість цих точок. Ідея цього алгоритму кластеризації полягає в тому, щоб знайти k центроїд, де кожна точка з набору даних буде належати будь-якій з k-множин, що мають мінімальну евклідову відстань.</a:t>
-            </a:r>
-            <a:endParaRPr lang="en-US" sz="2000" dirty="0"/>
-          </a:p>
-        </p:txBody>
-      </p:sp>
-      <p:pic>
-        <p:nvPicPr>
-          <p:cNvPr id="3" name="Рисунок 2">
-            <a:extLst>
-              <a:ext uri="{FF2B5EF4-FFF2-40B4-BE49-F238E27FC236}">
-                <a16:creationId xmlns:a16="http://schemas.microsoft.com/office/drawing/2014/main" id="{BDE06C2A-039D-4BBA-91E7-B41E4E92A0BC}"/>
-              </a:ext>
-            </a:extLst>
-          </p:cNvPr>
-          <p:cNvPicPr>
-            <a:picLocks noChangeAspect="1"/>
-          </p:cNvPicPr>
-          <p:nvPr/>
-        </p:nvPicPr>
-        <p:blipFill>
-          <a:blip r:embed="rId3"/>
-          <a:stretch>
-            <a:fillRect/>
-          </a:stretch>
-        </p:blipFill>
-        <p:spPr>
-          <a:xfrm>
-            <a:off x="443535" y="1272830"/>
-            <a:ext cx="8681570" cy="1837178"/>
-          </a:xfrm>
-          <a:prstGeom prst="rect">
-            <a:avLst/>
-          </a:prstGeom>
-        </p:spPr>
-      </p:pic>
-    </p:spTree>
-    <p:extLst>
-      <p:ext uri="{BB962C8B-B14F-4D97-AF65-F5344CB8AC3E}">
-        <p14:creationId xmlns:p14="http://schemas.microsoft.com/office/powerpoint/2010/main" val="1861416559"/>
-      </p:ext>
-    </p:extLst>
-  </p:cSld>
-  <p:clrMapOvr>
-    <a:masterClrMapping/>
-  </p:clrMapOvr>
-</p:sld>
-</file>
-
-<file path=ppt/slides/slide11.xml><?xml version="1.0" encoding="utf-8"?>
 <p:sld xmlns:a="http://schemas.openxmlformats.org/drawingml/2006/main" xmlns:r="http://schemas.openxmlformats.org/officeDocument/2006/relationships" xmlns:p="http://schemas.openxmlformats.org/presentationml/2006/main">
   <p:cSld>
     <p:spTree>
@@ -8105,7 +7860,7 @@
 </p:sld>
 </file>
 
-<file path=ppt/slides/slide12.xml><?xml version="1.0" encoding="utf-8"?>
+<file path=ppt/slides/slide11.xml><?xml version="1.0" encoding="utf-8"?>
 <p:sld xmlns:a="http://schemas.openxmlformats.org/drawingml/2006/main" xmlns:r="http://schemas.openxmlformats.org/officeDocument/2006/relationships" xmlns:p="http://schemas.openxmlformats.org/presentationml/2006/main">
   <p:cSld>
     <p:spTree>
@@ -8355,8 +8110,8 @@
           </a:p>
         </p:txBody>
       </p:sp>
-      <mc:AlternateContent xmlns:mc="http://schemas.openxmlformats.org/markup-compatibility/2006">
-        <mc:Choice xmlns:a14="http://schemas.microsoft.com/office/drawing/2010/main" Requires="a14">
+      <mc:AlternateContent xmlns:mc="http://schemas.openxmlformats.org/markup-compatibility/2006" xmlns:a14="http://schemas.microsoft.com/office/drawing/2010/main">
+        <mc:Choice Requires="a14">
           <p:sp>
             <p:nvSpPr>
               <p:cNvPr id="7" name="TextBox 6">
@@ -8580,7 +8335,7 @@
             </p:txBody>
           </p:sp>
         </mc:Choice>
-        <mc:Fallback>
+        <mc:Fallback xmlns="">
           <p:sp>
             <p:nvSpPr>
               <p:cNvPr id="7" name="TextBox 6">
@@ -8638,7 +8393,7 @@
 </p:sld>
 </file>
 
-<file path=ppt/slides/slide13.xml><?xml version="1.0" encoding="utf-8"?>
+<file path=ppt/slides/slide12.xml><?xml version="1.0" encoding="utf-8"?>
 <p:sld xmlns:a="http://schemas.openxmlformats.org/drawingml/2006/main" xmlns:r="http://schemas.openxmlformats.org/officeDocument/2006/relationships" xmlns:p="http://schemas.openxmlformats.org/presentationml/2006/main">
   <p:cSld>
     <p:spTree>
@@ -9217,7 +8972,7 @@
 </p:sld>
 </file>
 
-<file path=ppt/slides/slide14.xml><?xml version="1.0" encoding="utf-8"?>
+<file path=ppt/slides/slide13.xml><?xml version="1.0" encoding="utf-8"?>
 <p:sld xmlns:a="http://schemas.openxmlformats.org/drawingml/2006/main" xmlns:r="http://schemas.openxmlformats.org/officeDocument/2006/relationships" xmlns:p="http://schemas.openxmlformats.org/presentationml/2006/main">
   <p:cSld>
     <p:spTree>
@@ -9600,7 +9355,7 @@
 </p:sld>
 </file>
 
-<file path=ppt/slides/slide15.xml><?xml version="1.0" encoding="utf-8"?>
+<file path=ppt/slides/slide14.xml><?xml version="1.0" encoding="utf-8"?>
 <p:sld xmlns:a="http://schemas.openxmlformats.org/drawingml/2006/main" xmlns:r="http://schemas.openxmlformats.org/officeDocument/2006/relationships" xmlns:p="http://schemas.openxmlformats.org/presentationml/2006/main">
   <p:cSld>
     <p:spTree>
@@ -9923,7 +9678,7 @@
 </p:sld>
 </file>
 
-<file path=ppt/slides/slide16.xml><?xml version="1.0" encoding="utf-8"?>
+<file path=ppt/slides/slide15.xml><?xml version="1.0" encoding="utf-8"?>
 <p:sld xmlns:a="http://schemas.openxmlformats.org/drawingml/2006/main" xmlns:r="http://schemas.openxmlformats.org/officeDocument/2006/relationships" xmlns:p="http://schemas.openxmlformats.org/presentationml/2006/main">
   <p:cSld>
     <p:spTree>
@@ -10146,7 +9901,7 @@
 </p:sld>
 </file>
 
-<file path=ppt/slides/slide17.xml><?xml version="1.0" encoding="utf-8"?>
+<file path=ppt/slides/slide16.xml><?xml version="1.0" encoding="utf-8"?>
 <p:sld xmlns:a="http://schemas.openxmlformats.org/drawingml/2006/main" xmlns:r="http://schemas.openxmlformats.org/officeDocument/2006/relationships" xmlns:p="http://schemas.openxmlformats.org/presentationml/2006/main">
   <p:cSld>
     <p:spTree>
@@ -10422,7 +10177,7 @@
 </p:sld>
 </file>
 
-<file path=ppt/slides/slide18.xml><?xml version="1.0" encoding="utf-8"?>
+<file path=ppt/slides/slide17.xml><?xml version="1.0" encoding="utf-8"?>
 <p:sld xmlns:a="http://schemas.openxmlformats.org/drawingml/2006/main" xmlns:r="http://schemas.openxmlformats.org/officeDocument/2006/relationships" xmlns:p="http://schemas.openxmlformats.org/presentationml/2006/main">
   <p:cSld>
     <p:spTree>
@@ -10565,226 +10320,6 @@
 </file>
 
 <file path=ppt/slides/slide2.xml><?xml version="1.0" encoding="utf-8"?>
-<p:sld xmlns:a="http://schemas.openxmlformats.org/drawingml/2006/main" xmlns:r="http://schemas.openxmlformats.org/officeDocument/2006/relationships" xmlns:p="http://schemas.openxmlformats.org/presentationml/2006/main">
-  <p:cSld>
-    <p:spTree>
-      <p:nvGrpSpPr>
-        <p:cNvPr id="1" name=""/>
-        <p:cNvGrpSpPr/>
-        <p:nvPr/>
-      </p:nvGrpSpPr>
-      <p:grpSpPr>
-        <a:xfrm>
-          <a:off x="0" y="0"/>
-          <a:ext cx="0" cy="0"/>
-          <a:chOff x="0" y="0"/>
-          <a:chExt cx="0" cy="0"/>
-        </a:xfrm>
-      </p:grpSpPr>
-      <p:sp>
-        <p:nvSpPr>
-          <p:cNvPr id="2" name="Заголовок 1">
-            <a:extLst>
-              <a:ext uri="{FF2B5EF4-FFF2-40B4-BE49-F238E27FC236}">
-                <a16:creationId xmlns:a16="http://schemas.microsoft.com/office/drawing/2014/main" id="{FAACE456-2522-4A50-A5AF-8D45AF6D5235}"/>
-              </a:ext>
-            </a:extLst>
-          </p:cNvPr>
-          <p:cNvSpPr>
-            <a:spLocks noGrp="1"/>
-          </p:cNvSpPr>
-          <p:nvPr>
-            <p:ph type="ctrTitle"/>
-          </p:nvPr>
-        </p:nvSpPr>
-        <p:spPr>
-          <a:xfrm>
-            <a:off x="1116449" y="2267901"/>
-            <a:ext cx="8320514" cy="1646302"/>
-          </a:xfrm>
-        </p:spPr>
-        <p:txBody>
-          <a:bodyPr/>
-          <a:lstStyle/>
-          <a:p>
-            <a:pPr algn="ctr"/>
-            <a:r>
-              <a:rPr lang="uk-UA" sz="3600" dirty="0">
-                <a:solidFill>
-                  <a:srgbClr val="0070C0"/>
-                </a:solidFill>
-              </a:rPr>
-              <a:t>Розробка системи к</a:t>
-            </a:r>
-            <a:r>
-              <a:rPr lang="uk-UA" sz="3600" i="0" dirty="0">
-                <a:solidFill>
-                  <a:srgbClr val="0070C0"/>
-                </a:solidFill>
-                <a:effectLst/>
-              </a:rPr>
-              <a:t>ластеризації антитіл на основі коефіцієнту перехресного зв’язування</a:t>
-            </a:r>
-            <a:endParaRPr lang="uk-UA" sz="3600" dirty="0">
-              <a:solidFill>
-                <a:srgbClr val="0070C0"/>
-              </a:solidFill>
-            </a:endParaRPr>
-          </a:p>
-        </p:txBody>
-      </p:sp>
-      <p:sp>
-        <p:nvSpPr>
-          <p:cNvPr id="3" name="Підзаголовок 2">
-            <a:extLst>
-              <a:ext uri="{FF2B5EF4-FFF2-40B4-BE49-F238E27FC236}">
-                <a16:creationId xmlns:a16="http://schemas.microsoft.com/office/drawing/2014/main" id="{BBA7687D-235C-4363-98F9-472805C2A0B0}"/>
-              </a:ext>
-            </a:extLst>
-          </p:cNvPr>
-          <p:cNvSpPr>
-            <a:spLocks noGrp="1"/>
-          </p:cNvSpPr>
-          <p:nvPr>
-            <p:ph type="subTitle" idx="1"/>
-          </p:nvPr>
-        </p:nvSpPr>
-        <p:spPr>
-          <a:xfrm>
-            <a:off x="406235" y="4849823"/>
-            <a:ext cx="4290051" cy="1799551"/>
-          </a:xfrm>
-        </p:spPr>
-        <p:txBody>
-          <a:bodyPr>
-            <a:noAutofit/>
-          </a:bodyPr>
-          <a:lstStyle/>
-          <a:p>
-            <a:pPr algn="l">
-              <a:lnSpc>
-                <a:spcPct val="150000"/>
-              </a:lnSpc>
-              <a:spcBef>
-                <a:spcPts val="0"/>
-              </a:spcBef>
-            </a:pPr>
-            <a:r>
-              <a:rPr lang="uk-UA" dirty="0">
-                <a:solidFill>
-                  <a:schemeClr val="tx1"/>
-                </a:solidFill>
-              </a:rPr>
-              <a:t>Виконав: Зелінський Олександр</a:t>
-            </a:r>
-          </a:p>
-          <a:p>
-            <a:pPr algn="l">
-              <a:lnSpc>
-                <a:spcPct val="150000"/>
-              </a:lnSpc>
-              <a:spcBef>
-                <a:spcPts val="0"/>
-              </a:spcBef>
-            </a:pPr>
-            <a:r>
-              <a:rPr lang="uk-UA" dirty="0">
-                <a:solidFill>
-                  <a:schemeClr val="tx1"/>
-                </a:solidFill>
-              </a:rPr>
-              <a:t>Група: ПМіМ-12</a:t>
-            </a:r>
-          </a:p>
-          <a:p>
-            <a:pPr algn="l">
-              <a:lnSpc>
-                <a:spcPct val="150000"/>
-              </a:lnSpc>
-              <a:spcBef>
-                <a:spcPts val="0"/>
-              </a:spcBef>
-            </a:pPr>
-            <a:r>
-              <a:rPr lang="uk-UA" dirty="0">
-                <a:solidFill>
-                  <a:schemeClr val="tx1"/>
-                </a:solidFill>
-              </a:rPr>
-              <a:t>Науковий керівник: доц. </a:t>
-            </a:r>
-            <a:r>
-              <a:rPr lang="uk-UA" dirty="0" err="1">
-                <a:solidFill>
-                  <a:schemeClr val="tx1"/>
-                </a:solidFill>
-              </a:rPr>
-              <a:t>Горлач</a:t>
-            </a:r>
-            <a:r>
-              <a:rPr lang="uk-UA" dirty="0">
-                <a:solidFill>
-                  <a:schemeClr val="tx1"/>
-                </a:solidFill>
-              </a:rPr>
-              <a:t> В.М.</a:t>
-            </a:r>
-          </a:p>
-          <a:p>
-            <a:pPr algn="l">
-              <a:lnSpc>
-                <a:spcPct val="150000"/>
-              </a:lnSpc>
-              <a:spcBef>
-                <a:spcPts val="0"/>
-              </a:spcBef>
-            </a:pPr>
-            <a:r>
-              <a:rPr lang="uk-UA" dirty="0">
-                <a:solidFill>
-                  <a:schemeClr val="tx1"/>
-                </a:solidFill>
-              </a:rPr>
-              <a:t>Консультант: </a:t>
-            </a:r>
-            <a:r>
-              <a:rPr lang="uk-UA" dirty="0" err="1">
-                <a:solidFill>
-                  <a:schemeClr val="tx1"/>
-                </a:solidFill>
-              </a:rPr>
-              <a:t>Лебедін</a:t>
-            </a:r>
-            <a:r>
-              <a:rPr lang="uk-UA" dirty="0">
-                <a:solidFill>
-                  <a:schemeClr val="tx1"/>
-                </a:solidFill>
-              </a:rPr>
-              <a:t> Ю.С.</a:t>
-            </a:r>
-            <a:endParaRPr lang="en-US" dirty="0">
-              <a:solidFill>
-                <a:schemeClr val="tx1"/>
-              </a:solidFill>
-            </a:endParaRPr>
-          </a:p>
-        </p:txBody>
-      </p:sp>
-    </p:spTree>
-    <p:extLst>
-      <p:ext uri="{BB962C8B-B14F-4D97-AF65-F5344CB8AC3E}">
-        <p14:creationId xmlns:p14="http://schemas.microsoft.com/office/powerpoint/2010/main" val="3087773559"/>
-      </p:ext>
-    </p:extLst>
-  </p:cSld>
-  <p:clrMapOvr>
-    <a:masterClrMapping/>
-  </p:clrMapOvr>
-</p:sld>
-</file>
-
-<file path=ppt/slides/slide3.xml><?xml version="1.0" encoding="utf-8"?>
 <p:sld xmlns:a="http://schemas.openxmlformats.org/drawingml/2006/main" xmlns:r="http://schemas.openxmlformats.org/officeDocument/2006/relationships" xmlns:p="http://schemas.openxmlformats.org/presentationml/2006/main">
   <p:cSld>
     <p:spTree>
@@ -11743,7 +11278,7 @@
 </p:sld>
 </file>
 
-<file path=ppt/slides/slide4.xml><?xml version="1.0" encoding="utf-8"?>
+<file path=ppt/slides/slide3.xml><?xml version="1.0" encoding="utf-8"?>
 <p:sld xmlns:a="http://schemas.openxmlformats.org/drawingml/2006/main" xmlns:r="http://schemas.openxmlformats.org/officeDocument/2006/relationships" xmlns:p="http://schemas.openxmlformats.org/presentationml/2006/main">
   <p:cSld>
     <p:spTree>
@@ -11914,7 +11449,7 @@
 </p:sld>
 </file>
 
-<file path=ppt/slides/slide5.xml><?xml version="1.0" encoding="utf-8"?>
+<file path=ppt/slides/slide4.xml><?xml version="1.0" encoding="utf-8"?>
 <p:sld xmlns:a="http://schemas.openxmlformats.org/drawingml/2006/main" xmlns:r="http://schemas.openxmlformats.org/officeDocument/2006/relationships" xmlns:p="http://schemas.openxmlformats.org/presentationml/2006/main">
   <p:cSld>
     <p:spTree>
@@ -12042,8 +11577,8 @@
           </a:p>
         </p:txBody>
       </p:sp>
-      <mc:AlternateContent xmlns:mc="http://schemas.openxmlformats.org/markup-compatibility/2006" xmlns:a14="http://schemas.microsoft.com/office/drawing/2010/main">
-        <mc:Choice Requires="a14">
+      <mc:AlternateContent xmlns:mc="http://schemas.openxmlformats.org/markup-compatibility/2006">
+        <mc:Choice xmlns:a14="http://schemas.microsoft.com/office/drawing/2010/main" Requires="a14">
           <p:sp>
             <p:nvSpPr>
               <p:cNvPr id="6" name="TextBox 5">
@@ -12102,7 +11637,7 @@
                 </a:r>
                 <a:r>
                   <a:rPr lang="uk-UA" sz="2400" dirty="0"/>
-                  <a:t>з хорошим зв’язуванням 	</a:t>
+                  <a:t>з поганим зв’язуванням 	</a:t>
                 </a:r>
                 <a14:m>
                   <m:oMath xmlns:m="http://schemas.openxmlformats.org/officeDocument/2006/math">
@@ -12401,17 +11936,17 @@
                     <a:latin typeface="+mj-lt"/>
                     <a:cs typeface="Times New Roman" panose="02020603050405020304" pitchFamily="18" charset="0"/>
                   </a:rPr>
-                  <a:t>‒ </a:t>
+                  <a:t>‒ з</a:t>
                 </a:r>
                 <a:r>
                   <a:rPr lang="uk-UA" sz="2400" dirty="0"/>
-                  <a:t>Майже без зв’язування</a:t>
+                  <a:t> хорошим зв’язування</a:t>
                 </a:r>
               </a:p>
             </p:txBody>
           </p:sp>
         </mc:Choice>
-        <mc:Fallback xmlns="">
+        <mc:Fallback>
           <p:sp>
             <p:nvSpPr>
               <p:cNvPr id="6" name="TextBox 5">
@@ -12469,7 +12004,7 @@
 </p:sld>
 </file>
 
-<file path=ppt/slides/slide6.xml><?xml version="1.0" encoding="utf-8"?>
+<file path=ppt/slides/slide5.xml><?xml version="1.0" encoding="utf-8"?>
 <p:sld xmlns:a="http://schemas.openxmlformats.org/drawingml/2006/main" xmlns:r="http://schemas.openxmlformats.org/officeDocument/2006/relationships" xmlns:p="http://schemas.openxmlformats.org/presentationml/2006/main">
   <p:cSld>
     <p:spTree>
@@ -12640,7 +12175,7 @@
 </p:sld>
 </file>
 
-<file path=ppt/slides/slide7.xml><?xml version="1.0" encoding="utf-8"?>
+<file path=ppt/slides/slide6.xml><?xml version="1.0" encoding="utf-8"?>
 <p:sld xmlns:a="http://schemas.openxmlformats.org/drawingml/2006/main" xmlns:r="http://schemas.openxmlformats.org/officeDocument/2006/relationships" xmlns:p="http://schemas.openxmlformats.org/presentationml/2006/main">
   <p:cSld>
     <p:spTree>
@@ -12826,7 +12361,7 @@
 </p:sld>
 </file>
 
-<file path=ppt/slides/slide8.xml><?xml version="1.0" encoding="utf-8"?>
+<file path=ppt/slides/slide7.xml><?xml version="1.0" encoding="utf-8"?>
 <p:sld xmlns:a="http://schemas.openxmlformats.org/drawingml/2006/main" xmlns:r="http://schemas.openxmlformats.org/officeDocument/2006/relationships" xmlns:p="http://schemas.openxmlformats.org/presentationml/2006/main">
   <p:cSld>
     <p:spTree>
@@ -17232,7 +16767,7 @@
 </p:sld>
 </file>
 
-<file path=ppt/slides/slide9.xml><?xml version="1.0" encoding="utf-8"?>
+<file path=ppt/slides/slide8.xml><?xml version="1.0" encoding="utf-8"?>
 <p:sld xmlns:a="http://schemas.openxmlformats.org/drawingml/2006/main" xmlns:r="http://schemas.openxmlformats.org/officeDocument/2006/relationships" xmlns:p="http://schemas.openxmlformats.org/presentationml/2006/main">
   <p:cSld>
     <p:spTree>
@@ -17394,6 +16929,258 @@
     <p:extLst>
       <p:ext uri="{BB962C8B-B14F-4D97-AF65-F5344CB8AC3E}">
         <p14:creationId xmlns:p14="http://schemas.microsoft.com/office/powerpoint/2010/main" val="2731102270"/>
+      </p:ext>
+    </p:extLst>
+  </p:cSld>
+  <p:clrMapOvr>
+    <a:masterClrMapping/>
+  </p:clrMapOvr>
+</p:sld>
+</file>
+
+<file path=ppt/slides/slide9.xml><?xml version="1.0" encoding="utf-8"?>
+<p:sld xmlns:a="http://schemas.openxmlformats.org/drawingml/2006/main" xmlns:r="http://schemas.openxmlformats.org/officeDocument/2006/relationships" xmlns:p="http://schemas.openxmlformats.org/presentationml/2006/main">
+  <p:cSld>
+    <p:spTree>
+      <p:nvGrpSpPr>
+        <p:cNvPr id="1" name=""/>
+        <p:cNvGrpSpPr/>
+        <p:nvPr/>
+      </p:nvGrpSpPr>
+      <p:grpSpPr>
+        <a:xfrm>
+          <a:off x="0" y="0"/>
+          <a:ext cx="0" cy="0"/>
+          <a:chOff x="0" y="0"/>
+          <a:chExt cx="0" cy="0"/>
+        </a:xfrm>
+      </p:grpSpPr>
+      <p:sp>
+        <p:nvSpPr>
+          <p:cNvPr id="4" name="Заголовок 1">
+            <a:extLst>
+              <a:ext uri="{FF2B5EF4-FFF2-40B4-BE49-F238E27FC236}">
+                <a16:creationId xmlns:a16="http://schemas.microsoft.com/office/drawing/2014/main" id="{F8243150-867F-42C4-B527-2FA91B461363}"/>
+              </a:ext>
+            </a:extLst>
+          </p:cNvPr>
+          <p:cNvSpPr txBox="1">
+            <a:spLocks/>
+          </p:cNvSpPr>
+          <p:nvPr/>
+        </p:nvSpPr>
+        <p:spPr>
+          <a:xfrm>
+            <a:off x="233328" y="238379"/>
+            <a:ext cx="9081856" cy="747042"/>
+          </a:xfrm>
+          <a:prstGeom prst="rect">
+            <a:avLst/>
+          </a:prstGeom>
+        </p:spPr>
+        <p:txBody>
+          <a:bodyPr vert="horz" lIns="91440" tIns="45720" rIns="91440" bIns="45720" rtlCol="0" anchor="t">
+            <a:normAutofit/>
+          </a:bodyPr>
+          <a:lstStyle>
+            <a:lvl1pPr algn="l" defTabSz="457200" rtl="0" eaLnBrk="1" latinLnBrk="0" hangingPunct="1">
+              <a:spcBef>
+                <a:spcPct val="0"/>
+              </a:spcBef>
+              <a:buNone/>
+              <a:defRPr sz="3600" kern="1200">
+                <a:solidFill>
+                  <a:schemeClr val="accent1"/>
+                </a:solidFill>
+                <a:latin typeface="+mj-lt"/>
+                <a:ea typeface="+mj-ea"/>
+                <a:cs typeface="+mj-cs"/>
+              </a:defRPr>
+            </a:lvl1pPr>
+            <a:lvl2pPr eaLnBrk="1" hangingPunct="1">
+              <a:defRPr>
+                <a:solidFill>
+                  <a:schemeClr val="tx2"/>
+                </a:solidFill>
+              </a:defRPr>
+            </a:lvl2pPr>
+            <a:lvl3pPr eaLnBrk="1" hangingPunct="1">
+              <a:defRPr>
+                <a:solidFill>
+                  <a:schemeClr val="tx2"/>
+                </a:solidFill>
+              </a:defRPr>
+            </a:lvl3pPr>
+            <a:lvl4pPr eaLnBrk="1" hangingPunct="1">
+              <a:defRPr>
+                <a:solidFill>
+                  <a:schemeClr val="tx2"/>
+                </a:solidFill>
+              </a:defRPr>
+            </a:lvl4pPr>
+            <a:lvl5pPr eaLnBrk="1" hangingPunct="1">
+              <a:defRPr>
+                <a:solidFill>
+                  <a:schemeClr val="tx2"/>
+                </a:solidFill>
+              </a:defRPr>
+            </a:lvl5pPr>
+            <a:lvl6pPr eaLnBrk="1" hangingPunct="1">
+              <a:defRPr>
+                <a:solidFill>
+                  <a:schemeClr val="tx2"/>
+                </a:solidFill>
+              </a:defRPr>
+            </a:lvl6pPr>
+            <a:lvl7pPr eaLnBrk="1" hangingPunct="1">
+              <a:defRPr>
+                <a:solidFill>
+                  <a:schemeClr val="tx2"/>
+                </a:solidFill>
+              </a:defRPr>
+            </a:lvl7pPr>
+            <a:lvl8pPr eaLnBrk="1" hangingPunct="1">
+              <a:defRPr>
+                <a:solidFill>
+                  <a:schemeClr val="tx2"/>
+                </a:solidFill>
+              </a:defRPr>
+            </a:lvl8pPr>
+            <a:lvl9pPr eaLnBrk="1" hangingPunct="1">
+              <a:defRPr>
+                <a:solidFill>
+                  <a:schemeClr val="tx2"/>
+                </a:solidFill>
+              </a:defRPr>
+            </a:lvl9pPr>
+          </a:lstStyle>
+          <a:p>
+            <a:r>
+              <a:rPr lang="uk-UA" dirty="0">
+                <a:solidFill>
+                  <a:srgbClr val="0070C0"/>
+                </a:solidFill>
+              </a:rPr>
+              <a:t>Метод кластеризації </a:t>
+            </a:r>
+            <a:r>
+              <a:rPr lang="en-US" dirty="0">
+                <a:solidFill>
+                  <a:srgbClr val="0070C0"/>
+                </a:solidFill>
+              </a:rPr>
+              <a:t>k-means</a:t>
+            </a:r>
+            <a:r>
+              <a:rPr lang="uk-UA" dirty="0">
+                <a:solidFill>
+                  <a:srgbClr val="0070C0"/>
+                </a:solidFill>
+              </a:rPr>
+              <a:t> </a:t>
+            </a:r>
+          </a:p>
+        </p:txBody>
+      </p:sp>
+      <p:sp>
+        <p:nvSpPr>
+          <p:cNvPr id="8" name="TextBox 7">
+            <a:extLst>
+              <a:ext uri="{FF2B5EF4-FFF2-40B4-BE49-F238E27FC236}">
+                <a16:creationId xmlns:a16="http://schemas.microsoft.com/office/drawing/2014/main" id="{18852229-13C1-495A-8A2F-9EFD183EDC50}"/>
+              </a:ext>
+            </a:extLst>
+          </p:cNvPr>
+          <p:cNvSpPr txBox="1"/>
+          <p:nvPr/>
+        </p:nvSpPr>
+        <p:spPr>
+          <a:xfrm>
+            <a:off x="633613" y="3397417"/>
+            <a:ext cx="8491492" cy="2805833"/>
+          </a:xfrm>
+          <a:prstGeom prst="rect">
+            <a:avLst/>
+          </a:prstGeom>
+          <a:noFill/>
+        </p:spPr>
+        <p:txBody>
+          <a:bodyPr wrap="square">
+            <a:spAutoFit/>
+          </a:bodyPr>
+          <a:lstStyle/>
+          <a:p>
+            <a:pPr algn="just">
+              <a:lnSpc>
+                <a:spcPct val="150000"/>
+              </a:lnSpc>
+            </a:pPr>
+            <a:r>
+              <a:rPr lang="uk-UA" sz="2000" dirty="0"/>
+              <a:t>	</a:t>
+            </a:r>
+            <a:r>
+              <a:rPr lang="en-US" sz="2000" dirty="0"/>
+              <a:t>k-means (</a:t>
+            </a:r>
+            <a:r>
+              <a:rPr lang="uk-UA" sz="2000" dirty="0"/>
+              <a:t>k-середніх</a:t>
+            </a:r>
+            <a:r>
+              <a:rPr lang="en-US" sz="2000" dirty="0"/>
+              <a:t>)</a:t>
+            </a:r>
+            <a:r>
+              <a:rPr lang="uk-UA" sz="2000" dirty="0"/>
+              <a:t> – це популярний алгоритм кластеризації на основі </a:t>
+            </a:r>
+            <a:r>
+              <a:rPr lang="uk-UA" sz="2000" dirty="0" err="1"/>
+              <a:t>центроїдів</a:t>
+            </a:r>
+            <a:r>
+              <a:rPr lang="uk-UA" sz="2000" dirty="0"/>
+              <a:t>, який розділяє дані представлені у вигляді точок на k кластерів, кожен із яких має майже рівну кількість цих точок. Ідея цього алгоритму кластеризації полягає в тому, щоб знайти k центроїд, де кожна точка з набору даних буде належати будь-якій з k-множин, що мають мінімальну евклідову відстань.</a:t>
+            </a:r>
+            <a:endParaRPr lang="en-US" sz="2000" dirty="0"/>
+          </a:p>
+        </p:txBody>
+      </p:sp>
+      <p:pic>
+        <p:nvPicPr>
+          <p:cNvPr id="3" name="Рисунок 2">
+            <a:extLst>
+              <a:ext uri="{FF2B5EF4-FFF2-40B4-BE49-F238E27FC236}">
+                <a16:creationId xmlns:a16="http://schemas.microsoft.com/office/drawing/2014/main" id="{BDE06C2A-039D-4BBA-91E7-B41E4E92A0BC}"/>
+              </a:ext>
+            </a:extLst>
+          </p:cNvPr>
+          <p:cNvPicPr>
+            <a:picLocks noChangeAspect="1"/>
+          </p:cNvPicPr>
+          <p:nvPr/>
+        </p:nvPicPr>
+        <p:blipFill>
+          <a:blip r:embed="rId3"/>
+          <a:stretch>
+            <a:fillRect/>
+          </a:stretch>
+        </p:blipFill>
+        <p:spPr>
+          <a:xfrm>
+            <a:off x="443535" y="1272830"/>
+            <a:ext cx="8681570" cy="1837178"/>
+          </a:xfrm>
+          <a:prstGeom prst="rect">
+            <a:avLst/>
+          </a:prstGeom>
+        </p:spPr>
+      </p:pic>
+    </p:spTree>
+    <p:extLst>
+      <p:ext uri="{BB962C8B-B14F-4D97-AF65-F5344CB8AC3E}">
+        <p14:creationId xmlns:p14="http://schemas.microsoft.com/office/powerpoint/2010/main" val="1861416559"/>
       </p:ext>
     </p:extLst>
   </p:cSld>

</xml_diff>

<commit_message>
Add Unknown group to UI
</commit_message>
<xml_diff>
--- a/Documents/Зелінський_Олександр.pptx
+++ b/Documents/Зелінський_Олександр.pptx
@@ -219,7 +219,7 @@
           <a:p>
             <a:fld id="{586FF3FF-D377-4670-B4E0-8859B8BB81C2}" type="datetimeFigureOut">
               <a:rPr lang="en-US" smtClean="0"/>
-              <a:t>5/8/2022</a:t>
+              <a:t>5/23/2022</a:t>
             </a:fld>
             <a:endParaRPr lang="en-US"/>
           </a:p>
@@ -1596,7 +1596,7 @@
           <a:p>
             <a:fld id="{716955FD-5218-4B18-8B2D-05970B9A6621}" type="datetimeFigureOut">
               <a:rPr lang="en-US" smtClean="0"/>
-              <a:t>5/8/2022</a:t>
+              <a:t>5/23/2022</a:t>
             </a:fld>
             <a:endParaRPr lang="en-US"/>
           </a:p>
@@ -1847,7 +1847,7 @@
           <a:p>
             <a:fld id="{716955FD-5218-4B18-8B2D-05970B9A6621}" type="datetimeFigureOut">
               <a:rPr lang="en-US" smtClean="0"/>
-              <a:t>5/8/2022</a:t>
+              <a:t>5/23/2022</a:t>
             </a:fld>
             <a:endParaRPr lang="en-US"/>
           </a:p>
@@ -2161,7 +2161,7 @@
           <a:p>
             <a:fld id="{716955FD-5218-4B18-8B2D-05970B9A6621}" type="datetimeFigureOut">
               <a:rPr lang="en-US" smtClean="0"/>
-              <a:t>5/8/2022</a:t>
+              <a:t>5/23/2022</a:t>
             </a:fld>
             <a:endParaRPr lang="en-US"/>
           </a:p>
@@ -2494,7 +2494,7 @@
           <a:p>
             <a:fld id="{716955FD-5218-4B18-8B2D-05970B9A6621}" type="datetimeFigureOut">
               <a:rPr lang="en-US" smtClean="0"/>
-              <a:t>5/8/2022</a:t>
+              <a:t>5/23/2022</a:t>
             </a:fld>
             <a:endParaRPr lang="en-US"/>
           </a:p>
@@ -2808,7 +2808,7 @@
           <a:p>
             <a:fld id="{716955FD-5218-4B18-8B2D-05970B9A6621}" type="datetimeFigureOut">
               <a:rPr lang="en-US" smtClean="0"/>
-              <a:t>5/8/2022</a:t>
+              <a:t>5/23/2022</a:t>
             </a:fld>
             <a:endParaRPr lang="en-US"/>
           </a:p>
@@ -3201,7 +3201,7 @@
           <a:p>
             <a:fld id="{716955FD-5218-4B18-8B2D-05970B9A6621}" type="datetimeFigureOut">
               <a:rPr lang="en-US" smtClean="0"/>
-              <a:t>5/8/2022</a:t>
+              <a:t>5/23/2022</a:t>
             </a:fld>
             <a:endParaRPr lang="en-US"/>
           </a:p>
@@ -3371,7 +3371,7 @@
           <a:p>
             <a:fld id="{716955FD-5218-4B18-8B2D-05970B9A6621}" type="datetimeFigureOut">
               <a:rPr lang="en-US" smtClean="0"/>
-              <a:t>5/8/2022</a:t>
+              <a:t>5/23/2022</a:t>
             </a:fld>
             <a:endParaRPr lang="en-US"/>
           </a:p>
@@ -3551,7 +3551,7 @@
           <a:p>
             <a:fld id="{716955FD-5218-4B18-8B2D-05970B9A6621}" type="datetimeFigureOut">
               <a:rPr lang="en-US" smtClean="0"/>
-              <a:t>5/8/2022</a:t>
+              <a:t>5/23/2022</a:t>
             </a:fld>
             <a:endParaRPr lang="en-US"/>
           </a:p>
@@ -3721,7 +3721,7 @@
           <a:p>
             <a:fld id="{716955FD-5218-4B18-8B2D-05970B9A6621}" type="datetimeFigureOut">
               <a:rPr lang="en-US" smtClean="0"/>
-              <a:t>5/8/2022</a:t>
+              <a:t>5/23/2022</a:t>
             </a:fld>
             <a:endParaRPr lang="en-US"/>
           </a:p>
@@ -3968,7 +3968,7 @@
           <a:p>
             <a:fld id="{716955FD-5218-4B18-8B2D-05970B9A6621}" type="datetimeFigureOut">
               <a:rPr lang="en-US" smtClean="0"/>
-              <a:t>5/8/2022</a:t>
+              <a:t>5/23/2022</a:t>
             </a:fld>
             <a:endParaRPr lang="en-US"/>
           </a:p>
@@ -4200,7 +4200,7 @@
           <a:p>
             <a:fld id="{716955FD-5218-4B18-8B2D-05970B9A6621}" type="datetimeFigureOut">
               <a:rPr lang="en-US" smtClean="0"/>
-              <a:t>5/8/2022</a:t>
+              <a:t>5/23/2022</a:t>
             </a:fld>
             <a:endParaRPr lang="en-US"/>
           </a:p>
@@ -4574,7 +4574,7 @@
           <a:p>
             <a:fld id="{716955FD-5218-4B18-8B2D-05970B9A6621}" type="datetimeFigureOut">
               <a:rPr lang="en-US" smtClean="0"/>
-              <a:t>5/8/2022</a:t>
+              <a:t>5/23/2022</a:t>
             </a:fld>
             <a:endParaRPr lang="en-US"/>
           </a:p>
@@ -4697,7 +4697,7 @@
           <a:p>
             <a:fld id="{716955FD-5218-4B18-8B2D-05970B9A6621}" type="datetimeFigureOut">
               <a:rPr lang="en-US" smtClean="0"/>
-              <a:t>5/8/2022</a:t>
+              <a:t>5/23/2022</a:t>
             </a:fld>
             <a:endParaRPr lang="en-US"/>
           </a:p>
@@ -4792,7 +4792,7 @@
           <a:p>
             <a:fld id="{716955FD-5218-4B18-8B2D-05970B9A6621}" type="datetimeFigureOut">
               <a:rPr lang="en-US" smtClean="0"/>
-              <a:t>5/8/2022</a:t>
+              <a:t>5/23/2022</a:t>
             </a:fld>
             <a:endParaRPr lang="en-US"/>
           </a:p>
@@ -5047,7 +5047,7 @@
           <a:p>
             <a:fld id="{716955FD-5218-4B18-8B2D-05970B9A6621}" type="datetimeFigureOut">
               <a:rPr lang="en-US" smtClean="0"/>
-              <a:t>5/8/2022</a:t>
+              <a:t>5/23/2022</a:t>
             </a:fld>
             <a:endParaRPr lang="en-US"/>
           </a:p>
@@ -5352,7 +5352,7 @@
           <a:p>
             <a:fld id="{716955FD-5218-4B18-8B2D-05970B9A6621}" type="datetimeFigureOut">
               <a:rPr lang="en-US" smtClean="0"/>
-              <a:t>5/8/2022</a:t>
+              <a:t>5/23/2022</a:t>
             </a:fld>
             <a:endParaRPr lang="en-US"/>
           </a:p>
@@ -6054,7 +6054,7 @@
           <a:p>
             <a:fld id="{716955FD-5218-4B18-8B2D-05970B9A6621}" type="datetimeFigureOut">
               <a:rPr lang="en-US" smtClean="0"/>
-              <a:t>5/8/2022</a:t>
+              <a:t>5/23/2022</a:t>
             </a:fld>
             <a:endParaRPr lang="en-US"/>
           </a:p>
@@ -6909,11 +6909,7 @@
               <a:buAutoNum type="arabicPeriod"/>
             </a:pPr>
             <a:r>
-              <a:rPr lang="uk-UA" dirty="0">
-                <a:highlight>
-                  <a:srgbClr val="FFFF00"/>
-                </a:highlight>
-              </a:rPr>
+              <a:rPr lang="uk-UA" dirty="0"/>
               <a:t>Середнє змінюється на моду</a:t>
             </a:r>
           </a:p>
@@ -11581,8 +11577,8 @@
           </a:p>
         </p:txBody>
       </p:sp>
-      <mc:AlternateContent xmlns:mc="http://schemas.openxmlformats.org/markup-compatibility/2006" xmlns:a14="http://schemas.microsoft.com/office/drawing/2010/main">
-        <mc:Choice Requires="a14">
+      <mc:AlternateContent xmlns:mc="http://schemas.openxmlformats.org/markup-compatibility/2006">
+        <mc:Choice xmlns:a14="http://schemas.microsoft.com/office/drawing/2010/main" Requires="a14">
           <p:sp>
             <p:nvSpPr>
               <p:cNvPr id="6" name="TextBox 5">
@@ -11792,10 +11788,28 @@
                 </a:r>
                 <a:r>
                   <a:rPr lang="uk-UA" sz="2400" dirty="0"/>
-                  <a:t>з середнім зв’язуванням 	</a:t>
+                  <a:t>з середнім зв’язуванням 	 </a:t>
                 </a:r>
                 <a14:m>
                   <m:oMath xmlns:m="http://schemas.openxmlformats.org/officeDocument/2006/math">
+                    <m:r>
+                      <a:rPr lang="uk-UA" sz="2400">
+                        <a:latin typeface="Cambria Math" panose="02040503050406030204" pitchFamily="18" charset="0"/>
+                      </a:rPr>
+                      <m:t>0</m:t>
+                    </m:r>
+                    <m:r>
+                      <a:rPr lang="uk-UA" sz="2400" b="0" i="0" smtClean="0">
+                        <a:latin typeface="Cambria Math" panose="02040503050406030204" pitchFamily="18" charset="0"/>
+                      </a:rPr>
+                      <m:t>.75</m:t>
+                    </m:r>
+                    <m:r>
+                      <a:rPr lang="en-US" sz="2400" b="0" i="1" smtClean="0">
+                        <a:latin typeface="Cambria Math" panose="02040503050406030204" pitchFamily="18" charset="0"/>
+                      </a:rPr>
+                      <m:t>≥</m:t>
+                    </m:r>
                     <m:f>
                       <m:fPr>
                         <m:ctrlPr>
@@ -11809,18 +11823,10 @@
                           <a:rPr lang="en-US" sz="2400" i="1">
                             <a:latin typeface="Cambria Math" panose="02040503050406030204" pitchFamily="18" charset="0"/>
                           </a:rPr>
-                          <m:t>−(</m:t>
-                        </m:r>
-                        <m:r>
-                          <a:rPr lang="en-US" sz="2400" i="1">
-                            <a:latin typeface="Cambria Math" panose="02040503050406030204" pitchFamily="18" charset="0"/>
-                          </a:rPr>
-                          <m:t>𝑐𝑒𝑙𝑙</m:t>
+                          <m:t>−</m:t>
                         </m:r>
                         <m:d>
                           <m:dPr>
-                            <m:begChr m:val="["/>
-                            <m:endChr m:val="]"/>
                             <m:ctrlPr>
                               <a:rPr lang="en-US" sz="2400" i="1">
                                 <a:latin typeface="Cambria Math" panose="02040503050406030204" pitchFamily="18" charset="0"/>
@@ -11832,10 +11838,87 @@
                               <a:rPr lang="en-US" sz="2400" i="1">
                                 <a:latin typeface="Cambria Math" panose="02040503050406030204" pitchFamily="18" charset="0"/>
                               </a:rPr>
-                              <m:t>𝑖</m:t>
+                              <m:t>𝑐𝑒𝑙𝑙</m:t>
                             </m:r>
+                            <m:d>
+                              <m:dPr>
+                                <m:begChr m:val="["/>
+                                <m:endChr m:val="]"/>
+                                <m:ctrlPr>
+                                  <a:rPr lang="en-US" sz="2400" i="1">
+                                    <a:latin typeface="Cambria Math" panose="02040503050406030204" pitchFamily="18" charset="0"/>
+                                  </a:rPr>
+                                </m:ctrlPr>
+                              </m:dPr>
+                              <m:e>
+                                <m:r>
+                                  <a:rPr lang="en-US" sz="2400" i="1">
+                                    <a:latin typeface="Cambria Math" panose="02040503050406030204" pitchFamily="18" charset="0"/>
+                                  </a:rPr>
+                                  <m:t>𝑖</m:t>
+                                </m:r>
+                              </m:e>
+                            </m:d>
+                            <m:d>
+                              <m:dPr>
+                                <m:begChr m:val="["/>
+                                <m:endChr m:val="]"/>
+                                <m:ctrlPr>
+                                  <a:rPr lang="en-US" sz="2400" i="1">
+                                    <a:latin typeface="Cambria Math" panose="02040503050406030204" pitchFamily="18" charset="0"/>
+                                  </a:rPr>
+                                </m:ctrlPr>
+                              </m:dPr>
+                              <m:e>
+                                <m:r>
+                                  <a:rPr lang="en-US" sz="2400" i="1">
+                                    <a:latin typeface="Cambria Math" panose="02040503050406030204" pitchFamily="18" charset="0"/>
+                                  </a:rPr>
+                                  <m:t>𝑗</m:t>
+                                </m:r>
+                              </m:e>
+                            </m:d>
+                            <m:r>
+                              <a:rPr lang="en-US" sz="2400" i="1">
+                                <a:latin typeface="Cambria Math" panose="02040503050406030204" pitchFamily="18" charset="0"/>
+                              </a:rPr>
+                              <m:t>−</m:t>
+                            </m:r>
+                            <m:r>
+                              <a:rPr lang="en-US" sz="2400" i="1">
+                                <a:latin typeface="Cambria Math" panose="02040503050406030204" pitchFamily="18" charset="0"/>
+                              </a:rPr>
+                              <m:t>𝑏𝑙𝑎𝑛𝑘</m:t>
+                            </m:r>
+                            <m:d>
+                              <m:dPr>
+                                <m:begChr m:val="["/>
+                                <m:endChr m:val="]"/>
+                                <m:ctrlPr>
+                                  <a:rPr lang="en-US" sz="2400" i="1">
+                                    <a:latin typeface="Cambria Math" panose="02040503050406030204" pitchFamily="18" charset="0"/>
+                                  </a:rPr>
+                                </m:ctrlPr>
+                              </m:dPr>
+                              <m:e>
+                                <m:r>
+                                  <a:rPr lang="en-US" sz="2400" i="1">
+                                    <a:latin typeface="Cambria Math" panose="02040503050406030204" pitchFamily="18" charset="0"/>
+                                  </a:rPr>
+                                  <m:t>𝑗</m:t>
+                                </m:r>
+                              </m:e>
+                            </m:d>
                           </m:e>
                         </m:d>
+                      </m:num>
+                      <m:den>
+                        <m:r>
+                          <a:rPr lang="en-US" sz="2400" i="1">
+                            <a:latin typeface="Cambria Math" panose="02040503050406030204" pitchFamily="18" charset="0"/>
+                          </a:rPr>
+                          <m:t>𝑏𝑙𝑎𝑛𝑘</m:t>
+                        </m:r>
                         <m:d>
                           <m:dPr>
                             <m:begChr m:val="["/>
@@ -11855,69 +11938,19 @@
                             </m:r>
                           </m:e>
                         </m:d>
-                        <m:r>
-                          <a:rPr lang="en-US" sz="2400" i="1">
-                            <a:latin typeface="Cambria Math" panose="02040503050406030204" pitchFamily="18" charset="0"/>
-                          </a:rPr>
-                          <m:t>−</m:t>
-                        </m:r>
-                        <m:r>
-                          <a:rPr lang="en-US" sz="2400" i="1">
-                            <a:latin typeface="Cambria Math" panose="02040503050406030204" pitchFamily="18" charset="0"/>
-                          </a:rPr>
-                          <m:t>𝑏𝑙𝑎𝑛𝑘</m:t>
-                        </m:r>
-                        <m:r>
-                          <a:rPr lang="en-US" sz="2400" i="1">
-                            <a:latin typeface="Cambria Math" panose="02040503050406030204" pitchFamily="18" charset="0"/>
-                          </a:rPr>
-                          <m:t>[</m:t>
-                        </m:r>
-                        <m:r>
-                          <a:rPr lang="en-US" sz="2400" i="1">
-                            <a:latin typeface="Cambria Math" panose="02040503050406030204" pitchFamily="18" charset="0"/>
-                          </a:rPr>
-                          <m:t>𝑗</m:t>
-                        </m:r>
-                        <m:r>
-                          <a:rPr lang="en-US" sz="2400" i="1">
-                            <a:latin typeface="Cambria Math" panose="02040503050406030204" pitchFamily="18" charset="0"/>
-                          </a:rPr>
-                          <m:t>])</m:t>
-                        </m:r>
-                      </m:num>
-                      <m:den>
-                        <m:r>
-                          <a:rPr lang="en-US" sz="2400" i="1">
-                            <a:latin typeface="Cambria Math" panose="02040503050406030204" pitchFamily="18" charset="0"/>
-                          </a:rPr>
-                          <m:t>𝑏𝑙𝑎𝑛𝑘</m:t>
-                        </m:r>
-                        <m:r>
-                          <a:rPr lang="en-US" sz="2400" i="1">
-                            <a:latin typeface="Cambria Math" panose="02040503050406030204" pitchFamily="18" charset="0"/>
-                          </a:rPr>
-                          <m:t>[</m:t>
-                        </m:r>
-                        <m:r>
-                          <a:rPr lang="en-US" sz="2400" i="1">
-                            <a:latin typeface="Cambria Math" panose="02040503050406030204" pitchFamily="18" charset="0"/>
-                          </a:rPr>
-                          <m:t>𝑗</m:t>
-                        </m:r>
-                        <m:r>
-                          <a:rPr lang="en-US" sz="2400" i="1">
-                            <a:latin typeface="Cambria Math" panose="02040503050406030204" pitchFamily="18" charset="0"/>
-                          </a:rPr>
-                          <m:t>]</m:t>
-                        </m:r>
                       </m:den>
                     </m:f>
+                    <m:r>
+                      <a:rPr lang="en-US" sz="2400" b="0" i="1" smtClean="0">
+                        <a:latin typeface="Cambria Math" panose="02040503050406030204" pitchFamily="18" charset="0"/>
+                      </a:rPr>
+                      <m:t>&gt;</m:t>
+                    </m:r>
                     <m:r>
                       <a:rPr lang="en-US" sz="2400" i="1">
                         <a:latin typeface="Cambria Math" panose="02040503050406030204" pitchFamily="18" charset="0"/>
                       </a:rPr>
-                      <m:t>&gt;0.5</m:t>
+                      <m:t>0.5</m:t>
                     </m:r>
                   </m:oMath>
                 </a14:m>
@@ -11950,7 +11983,7 @@
             </p:txBody>
           </p:sp>
         </mc:Choice>
-        <mc:Fallback xmlns="">
+        <mc:Fallback>
           <p:sp>
             <p:nvSpPr>
               <p:cNvPr id="6" name="TextBox 5">
@@ -11976,7 +12009,7 @@
               <a:blipFill>
                 <a:blip r:embed="rId2"/>
                 <a:stretch>
-                  <a:fillRect l="-1121" r="-1051" b="-2258"/>
+                  <a:fillRect l="-1121" r="-1051" b="-1992"/>
                 </a:stretch>
               </a:blipFill>
             </p:spPr>

</xml_diff>